<commit_message>
fix(presentation): add AI comments, fix title visibility, add logo to all slides
</commit_message>
<xml_diff>
--- a/powerhouse_presentation_20250901_20250907.pptx
+++ b/powerhouse_presentation_20250901_20250907.pptx
@@ -3255,8 +3255,44 @@
         </p:nvSpPr>
         <p:spPr>
           <a:xfrm>
-            <a:off x="2286000" y="1645920"/>
-            <a:ext cx="7616952" cy="2743200"/>
+            <a:off x="914400" y="274320"/>
+            <a:ext cx="5486400" cy="457200"/>
+          </a:xfrm>
+          <a:prstGeom prst="rect">
+            <a:avLst/>
+          </a:prstGeom>
+          <a:noFill/>
+        </p:spPr>
+        <p:txBody>
+          <a:bodyPr wrap="none">
+            <a:spAutoFit/>
+          </a:bodyPr>
+          <a:lstStyle/>
+          <a:p>
+            <a:pPr algn="l">
+              <a:defRPr sz="1600" b="1">
+                <a:solidFill>
+                  <a:srgbClr val="E8F5E8"/>
+                </a:solidFill>
+                <a:latin typeface="Roboto"/>
+              </a:defRPr>
+            </a:pPr>
+            <a:r>
+              <a:t>БАНКОВСКИЕ ГАРАНТИИ</a:t>
+            </a:r>
+          </a:p>
+        </p:txBody>
+      </p:sp>
+      <p:sp>
+        <p:nvSpPr>
+          <p:cNvPr id="6" name="TextBox 5"/>
+          <p:cNvSpPr txBox="1"/>
+          <p:nvPr/>
+        </p:nvSpPr>
+        <p:spPr>
+          <a:xfrm>
+            <a:off x="1828800" y="2286000"/>
+            <a:ext cx="8531352" cy="1371600"/>
           </a:xfrm>
           <a:prstGeom prst="rect">
             <a:avLst/>
@@ -3271,7 +3307,7 @@
           <a:lstStyle/>
           <a:p>
             <a:pPr algn="ctr">
-              <a:defRPr sz="5200" b="1">
+              <a:defRPr sz="5800" b="1">
                 <a:solidFill>
                   <a:srgbClr val="FFFFFF"/>
                 </a:solidFill>
@@ -3279,66 +3315,79 @@
               </a:defRPr>
             </a:pPr>
             <a:r>
-              <a:t>БАНКОВСКИЕ ГАРАНТИИ</a:t>
-            </a:r>
-          </a:p>
+              <a:t>ОТЧЁТ ПО ЭФФЕКТИВНОСТИ</a:t>
+            </a:r>
+          </a:p>
+        </p:txBody>
+      </p:sp>
+      <p:sp>
+        <p:nvSpPr>
+          <p:cNvPr id="7" name="TextBox 6"/>
+          <p:cNvSpPr txBox="1"/>
+          <p:nvPr/>
+        </p:nvSpPr>
+        <p:spPr>
+          <a:xfrm>
+            <a:off x="1828800" y="1371600"/>
+            <a:ext cx="8531352" cy="731520"/>
+          </a:xfrm>
+          <a:prstGeom prst="rect">
+            <a:avLst/>
+          </a:prstGeom>
+          <a:noFill/>
+        </p:spPr>
+        <p:txBody>
+          <a:bodyPr wrap="none">
+            <a:spAutoFit/>
+          </a:bodyPr>
+          <a:lstStyle/>
           <a:p>
             <a:pPr algn="ctr">
-              <a:defRPr sz="5200" b="1">
+              <a:defRPr sz="2000">
+                <a:solidFill>
+                  <a:srgbClr val="C8E6C9"/>
+                </a:solidFill>
+                <a:latin typeface="Roboto"/>
+              </a:defRPr>
+            </a:pPr>
+            <a:r>
+              <a:t>Период 01.09.2025—07.09.2025</a:t>
+            </a:r>
+          </a:p>
+        </p:txBody>
+      </p:sp>
+      <p:sp>
+        <p:nvSpPr>
+          <p:cNvPr id="8" name="TextBox 7"/>
+          <p:cNvSpPr txBox="1"/>
+          <p:nvPr/>
+        </p:nvSpPr>
+        <p:spPr>
+          <a:xfrm>
+            <a:off x="1828800" y="3840480"/>
+            <a:ext cx="8531352" cy="548640"/>
+          </a:xfrm>
+          <a:prstGeom prst="rect">
+            <a:avLst/>
+          </a:prstGeom>
+          <a:noFill/>
+        </p:spPr>
+        <p:txBody>
+          <a:bodyPr wrap="none">
+            <a:spAutoFit/>
+          </a:bodyPr>
+          <a:lstStyle/>
+          <a:p>
+            <a:pPr algn="ctr">
+              <a:defRPr sz="2800" b="1">
                 <a:solidFill>
                   <a:srgbClr val="FFFFFF"/>
                 </a:solidFill>
                 <a:latin typeface="Roboto"/>
               </a:defRPr>
             </a:pPr>
-          </a:p>
-          <a:p>
-            <a:pPr algn="ctr">
-              <a:defRPr sz="5200" b="1">
-                <a:solidFill>
-                  <a:srgbClr val="FFFFFF"/>
-                </a:solidFill>
-                <a:latin typeface="Roboto"/>
-              </a:defRPr>
-            </a:pPr>
-            <a:r>
-              <a:t>ОТЧЁТ ПО ЭФФЕКТИВНОСТИ</a:t>
-            </a:r>
-          </a:p>
-        </p:txBody>
-      </p:sp>
-      <p:sp>
-        <p:nvSpPr>
-          <p:cNvPr id="6" name="TextBox 5"/>
-          <p:cNvSpPr txBox="1"/>
-          <p:nvPr/>
-        </p:nvSpPr>
-        <p:spPr>
-          <a:xfrm>
-            <a:off x="2286000" y="4572000"/>
-            <a:ext cx="7616952" cy="1371600"/>
-          </a:xfrm>
-          <a:prstGeom prst="rect">
-            <a:avLst/>
-          </a:prstGeom>
-          <a:noFill/>
-        </p:spPr>
-        <p:txBody>
-          <a:bodyPr wrap="none">
-            <a:spAutoFit/>
-          </a:bodyPr>
-          <a:lstStyle/>
-          <a:p>
-            <a:pPr algn="ctr">
-              <a:defRPr sz="2400">
-                <a:solidFill>
-                  <a:srgbClr val="E8F5E8"/>
-                </a:solidFill>
-                <a:latin typeface="Roboto"/>
-              </a:defRPr>
-            </a:pPr>
-            <a:r>
-              <a:t>Период 01.09.2025—07.09.2025 • 01.09.2025 — 07.09.2025</a:t>
+            <a:r>
+              <a:t>01.09.2025 — 07.09.2025</a:t>
             </a:r>
           </a:p>
         </p:txBody>
@@ -3532,7 +3581,7 @@
         <p:spPr>
           <a:xfrm>
             <a:off x="6858000" y="1371600"/>
-            <a:ext cx="4572000" cy="3200400"/>
+            <a:ext cx="4572000" cy="5029200"/>
           </a:xfrm>
           <a:prstGeom prst="roundRect">
             <a:avLst/>
@@ -3543,14 +3592,14 @@
                 <a:srgbClr val="FFFFFF"/>
               </a:gs>
               <a:gs pos="100000">
-                <a:srgbClr val="F5F5F5"/>
+                <a:srgbClr val="F1F8E9"/>
               </a:gs>
             </a:gsLst>
             <a:lin scaled="0"/>
           </a:gradFill>
-          <a:ln>
+          <a:ln w="25400">
             <a:solidFill>
-              <a:srgbClr val="E0E0E0"/>
+              <a:srgbClr val="C5E1A5"/>
             </a:solidFill>
           </a:ln>
           <a:effectLst/>
@@ -3585,8 +3634,8 @@
         </p:nvSpPr>
         <p:spPr>
           <a:xfrm>
-            <a:off x="7315200" y="1828800"/>
-            <a:ext cx="3657600" cy="2286000"/>
+            <a:off x="7315200" y="1645920"/>
+            <a:ext cx="3657600" cy="365760"/>
           </a:xfrm>
           <a:prstGeom prst="rect">
             <a:avLst/>
@@ -3599,88 +3648,55 @@
           </a:bodyPr>
           <a:lstStyle/>
           <a:p>
-            <a:pPr>
+            <a:pPr algn="ctr">
               <a:defRPr sz="1600" b="1">
                 <a:solidFill>
-                  <a:srgbClr val="1B5E20"/>
+                  <a:srgbClr val="2E7D32"/>
                 </a:solidFill>
                 <a:latin typeface="Roboto"/>
               </a:defRPr>
             </a:pPr>
             <a:r>
-              <a:t>📞 ИТОГИ НЕДЕЛИ</a:t>
-            </a:r>
-          </a:p>
+              <a:t>🤖 АНАЛИЗ КОМАНДЫ</a:t>
+            </a:r>
+          </a:p>
+        </p:txBody>
+      </p:sp>
+      <p:sp>
+        <p:nvSpPr>
+          <p:cNvPr id="8" name="TextBox 7"/>
+          <p:cNvSpPr txBox="1"/>
+          <p:nvPr/>
+        </p:nvSpPr>
+        <p:spPr>
+          <a:xfrm>
+            <a:off x="7315200" y="2194560"/>
+            <a:ext cx="3657600" cy="3657600"/>
+          </a:xfrm>
+          <a:prstGeom prst="rect">
+            <a:avLst/>
+          </a:prstGeom>
+          <a:noFill/>
+        </p:spPr>
+        <p:txBody>
+          <a:bodyPr wrap="square">
+            <a:spAutoFit/>
+          </a:bodyPr>
+          <a:lstStyle/>
           <a:p>
             <a:pPr>
-              <a:defRPr sz="1400">
+              <a:lnSpc>
+                <a:spcPct val="130000"/>
+              </a:lnSpc>
+              <a:defRPr sz="1300">
                 <a:solidFill>
-                  <a:srgbClr val="1B5E20"/>
+                  <a:srgbClr val="424242"/>
                 </a:solidFill>
                 <a:latin typeface="Roboto"/>
               </a:defRPr>
             </a:pPr>
-          </a:p>
-          <a:p>
-            <a:pPr>
-              <a:defRPr sz="1400">
-                <a:solidFill>
-                  <a:srgbClr val="1B5E20"/>
-                </a:solidFill>
-                <a:latin typeface="Roboto"/>
-              </a:defRPr>
-            </a:pPr>
-            <a:r>
-              <a:t>🎯 План звонков: 164</a:t>
-            </a:r>
-          </a:p>
-          <a:p>
-            <a:pPr>
-              <a:defRPr sz="1400">
-                <a:solidFill>
-                  <a:srgbClr val="1B5E20"/>
-                </a:solidFill>
-                <a:latin typeface="Roboto"/>
-              </a:defRPr>
-            </a:pPr>
-            <a:r>
-              <a:t>✅ Выполнено: 111</a:t>
-            </a:r>
-          </a:p>
-          <a:p>
-            <a:pPr>
-              <a:defRPr sz="1400">
-                <a:solidFill>
-                  <a:srgbClr val="1B5E20"/>
-                </a:solidFill>
-                <a:latin typeface="Roboto"/>
-              </a:defRPr>
-            </a:pPr>
-            <a:r>
-              <a:t>📊 Процент: 67,7%</a:t>
-            </a:r>
-          </a:p>
-          <a:p>
-            <a:pPr>
-              <a:defRPr sz="1400">
-                <a:solidFill>
-                  <a:srgbClr val="1B5E20"/>
-                </a:solidFill>
-                <a:latin typeface="Roboto"/>
-              </a:defRPr>
-            </a:pPr>
-          </a:p>
-          <a:p>
-            <a:pPr>
-              <a:defRPr sz="1400">
-                <a:solidFill>
-                  <a:srgbClr val="1B5E20"/>
-                </a:solidFill>
-                <a:latin typeface="Roboto"/>
-              </a:defRPr>
-            </a:pPr>
-            <a:r>
-              <a:t>💡 Новые контакты: 186</a:t>
+            <a:r>
+              <a:t>За период 01.09.2025—07.09.2025 количество перезвонить по заявкам составило 111 из 164 (67,7%), что свидетельствует о высокой конверсии на этапе перезвона. Количество обработанных заявок превысило плановое значение (18 и...</a:t>
             </a:r>
           </a:p>
         </p:txBody>

</xml_diff>